<commit_message>
Update second presentation with link to GitHub repo
</commit_message>
<xml_diff>
--- a/Presentations/2. Windows.pptx
+++ b/Presentations/2. Windows.pptx
@@ -884,7 +884,7 @@
   <pc:docChgLst>
     <pc:chgData name="Kristofer Carta" userId="a949ead7c4bcd18f" providerId="LiveId" clId="{BDB12BE9-6248-4518-AD0A-7BEFF3A06A4A}"/>
     <pc:docChg chg="undo redo custSel addSld delSld modSld sldOrd delMainMaster modSection">
-      <pc:chgData name="Kristofer Carta" userId="a949ead7c4bcd18f" providerId="LiveId" clId="{BDB12BE9-6248-4518-AD0A-7BEFF3A06A4A}" dt="2017-08-23T09:26:57.905" v="13361" actId="1076"/>
+      <pc:chgData name="Kristofer Carta" userId="a949ead7c4bcd18f" providerId="LiveId" clId="{BDB12BE9-6248-4518-AD0A-7BEFF3A06A4A}" dt="2017-08-23T09:35:41.418" v="13527" actId="20577"/>
       <pc:docMkLst>
         <pc:docMk/>
       </pc:docMkLst>
@@ -904,7 +904,22 @@
         </pc:spChg>
       </pc:sldChg>
       <pc:sldChg chg="modSp">
-        <pc:chgData name="Kristofer Carta" userId="a949ead7c4bcd18f" providerId="LiveId" clId="{BDB12BE9-6248-4518-AD0A-7BEFF3A06A4A}" dt="2017-08-22T21:03:05.652" v="1230" actId="20577"/>
+        <pc:chgData name="Kristofer Carta" userId="a949ead7c4bcd18f" providerId="LiveId" clId="{BDB12BE9-6248-4518-AD0A-7BEFF3A06A4A}" dt="2017-08-23T09:34:44.502" v="13411" actId="6549"/>
+        <pc:sldMkLst>
+          <pc:docMk/>
+          <pc:sldMk cId="1531087304" sldId="257"/>
+        </pc:sldMkLst>
+        <pc:spChg chg="mod">
+          <ac:chgData name="Kristofer Carta" userId="a949ead7c4bcd18f" providerId="LiveId" clId="{BDB12BE9-6248-4518-AD0A-7BEFF3A06A4A}" dt="2017-08-23T09:34:44.502" v="13411" actId="6549"/>
+          <ac:spMkLst>
+            <pc:docMk/>
+            <pc:sldMk cId="1531087304" sldId="257"/>
+            <ac:spMk id="2" creationId="{CFF8F415-0289-42DD-8368-9F4A4D4037B6}"/>
+          </ac:spMkLst>
+        </pc:spChg>
+      </pc:sldChg>
+      <pc:sldChg chg="addSp delSp modSp delDesignElem">
+        <pc:chgData name="Kristofer Carta" userId="a949ead7c4bcd18f" providerId="LiveId" clId="{BDB12BE9-6248-4518-AD0A-7BEFF3A06A4A}" dt="2017-08-23T09:34:09.247" v="13376"/>
         <pc:sldMkLst>
           <pc:docMk/>
           <pc:sldMk cId="3212783590" sldId="258"/>
@@ -915,6 +930,14 @@
             <pc:docMk/>
             <pc:sldMk cId="3212783590" sldId="258"/>
             <ac:spMk id="3" creationId="{05F9B296-6FED-46D7-B938-C6029FE5AE22}"/>
+          </ac:spMkLst>
+        </pc:spChg>
+        <pc:spChg chg="add del">
+          <ac:chgData name="Kristofer Carta" userId="a949ead7c4bcd18f" providerId="LiveId" clId="{BDB12BE9-6248-4518-AD0A-7BEFF3A06A4A}" dt="2017-08-23T09:34:09.247" v="13376"/>
+          <ac:spMkLst>
+            <pc:docMk/>
+            <pc:sldMk cId="3212783590" sldId="258"/>
+            <ac:spMk id="12" creationId="{00000000-0000-0000-0000-000000000000}"/>
           </ac:spMkLst>
         </pc:spChg>
       </pc:sldChg>
@@ -925,18 +948,34 @@
           <pc:sldMk cId="1871955869" sldId="259"/>
         </pc:sldMkLst>
       </pc:sldChg>
-      <pc:sldChg chg="modSp">
-        <pc:chgData name="Kristofer Carta" userId="a949ead7c4bcd18f" providerId="LiveId" clId="{BDB12BE9-6248-4518-AD0A-7BEFF3A06A4A}" dt="2017-08-22T21:04:12.316" v="1297" actId="20577"/>
+      <pc:sldChg chg="addSp delSp modSp delDesignElem">
+        <pc:chgData name="Kristofer Carta" userId="a949ead7c4bcd18f" providerId="LiveId" clId="{BDB12BE9-6248-4518-AD0A-7BEFF3A06A4A}" dt="2017-08-23T09:35:41.418" v="13527" actId="20577"/>
         <pc:sldMkLst>
           <pc:docMk/>
           <pc:sldMk cId="3956988050" sldId="260"/>
         </pc:sldMkLst>
         <pc:spChg chg="mod">
-          <ac:chgData name="Kristofer Carta" userId="a949ead7c4bcd18f" providerId="LiveId" clId="{BDB12BE9-6248-4518-AD0A-7BEFF3A06A4A}" dt="2017-08-22T21:04:12.316" v="1297" actId="20577"/>
+          <ac:chgData name="Kristofer Carta" userId="a949ead7c4bcd18f" providerId="LiveId" clId="{BDB12BE9-6248-4518-AD0A-7BEFF3A06A4A}" dt="2017-08-23T09:35:41.418" v="13527" actId="20577"/>
           <ac:spMkLst>
             <pc:docMk/>
             <pc:sldMk cId="3956988050" sldId="260"/>
             <ac:spMk id="3" creationId="{FFC353AD-FA04-47E2-BB20-54AD62996ABA}"/>
+          </ac:spMkLst>
+        </pc:spChg>
+        <pc:spChg chg="add del">
+          <ac:chgData name="Kristofer Carta" userId="a949ead7c4bcd18f" providerId="LiveId" clId="{BDB12BE9-6248-4518-AD0A-7BEFF3A06A4A}" dt="2017-08-23T09:34:09.247" v="13376"/>
+          <ac:spMkLst>
+            <pc:docMk/>
+            <pc:sldMk cId="3956988050" sldId="260"/>
+            <ac:spMk id="27" creationId="{00000000-0000-0000-0000-000000000000}"/>
+          </ac:spMkLst>
+        </pc:spChg>
+        <pc:spChg chg="add del">
+          <ac:chgData name="Kristofer Carta" userId="a949ead7c4bcd18f" providerId="LiveId" clId="{BDB12BE9-6248-4518-AD0A-7BEFF3A06A4A}" dt="2017-08-23T09:34:09.247" v="13376"/>
+          <ac:spMkLst>
+            <pc:docMk/>
+            <pc:sldMk cId="3956988050" sldId="260"/>
+            <ac:spMk id="28" creationId="{00000000-0000-0000-0000-000000000000}"/>
           </ac:spMkLst>
         </pc:spChg>
       </pc:sldChg>
@@ -1003,8 +1042,8 @@
           <pc:sldMk cId="2834989558" sldId="270"/>
         </pc:sldMkLst>
       </pc:sldChg>
-      <pc:sldChg chg="modSp">
-        <pc:chgData name="Kristofer Carta" userId="a949ead7c4bcd18f" providerId="LiveId" clId="{BDB12BE9-6248-4518-AD0A-7BEFF3A06A4A}" dt="2017-08-23T08:39:57.474" v="12133" actId="20577"/>
+      <pc:sldChg chg="addSp delSp modSp delDesignElem">
+        <pc:chgData name="Kristofer Carta" userId="a949ead7c4bcd18f" providerId="LiveId" clId="{BDB12BE9-6248-4518-AD0A-7BEFF3A06A4A}" dt="2017-08-23T09:34:09.247" v="13376"/>
         <pc:sldMkLst>
           <pc:docMk/>
           <pc:sldMk cId="2783061044" sldId="271"/>
@@ -1018,11 +1057,35 @@
           </ac:spMkLst>
         </pc:spChg>
         <pc:spChg chg="mod">
-          <ac:chgData name="Kristofer Carta" userId="a949ead7c4bcd18f" providerId="LiveId" clId="{BDB12BE9-6248-4518-AD0A-7BEFF3A06A4A}" dt="2017-08-23T08:39:57.474" v="12133" actId="20577"/>
+          <ac:chgData name="Kristofer Carta" userId="a949ead7c4bcd18f" providerId="LiveId" clId="{BDB12BE9-6248-4518-AD0A-7BEFF3A06A4A}" dt="2017-08-23T09:33:10.378" v="13367" actId="1076"/>
           <ac:spMkLst>
             <pc:docMk/>
             <pc:sldMk cId="2783061044" sldId="271"/>
             <ac:spMk id="3" creationId="{CB5CF5F7-55FD-40B2-8557-A3B9DF5E60B1}"/>
+          </ac:spMkLst>
+        </pc:spChg>
+        <pc:spChg chg="add del">
+          <ac:chgData name="Kristofer Carta" userId="a949ead7c4bcd18f" providerId="LiveId" clId="{BDB12BE9-6248-4518-AD0A-7BEFF3A06A4A}" dt="2017-08-23T09:34:09.247" v="13376"/>
+          <ac:spMkLst>
+            <pc:docMk/>
+            <pc:sldMk cId="2783061044" sldId="271"/>
+            <ac:spMk id="12" creationId="{00000000-0000-0000-0000-000000000000}"/>
+          </ac:spMkLst>
+        </pc:spChg>
+        <pc:spChg chg="add del">
+          <ac:chgData name="Kristofer Carta" userId="a949ead7c4bcd18f" providerId="LiveId" clId="{BDB12BE9-6248-4518-AD0A-7BEFF3A06A4A}" dt="2017-08-23T09:34:09.247" v="13376"/>
+          <ac:spMkLst>
+            <pc:docMk/>
+            <pc:sldMk cId="2783061044" sldId="271"/>
+            <ac:spMk id="13" creationId="{00000000-0000-0000-0000-000000000000}"/>
+          </ac:spMkLst>
+        </pc:spChg>
+        <pc:spChg chg="add del">
+          <ac:chgData name="Kristofer Carta" userId="a949ead7c4bcd18f" providerId="LiveId" clId="{BDB12BE9-6248-4518-AD0A-7BEFF3A06A4A}" dt="2017-08-23T09:34:09.247" v="13376"/>
+          <ac:spMkLst>
+            <pc:docMk/>
+            <pc:sldMk cId="2783061044" sldId="271"/>
+            <ac:spMk id="14" creationId="{00000000-0000-0000-0000-000000000000}"/>
           </ac:spMkLst>
         </pc:spChg>
       </pc:sldChg>
@@ -1558,8 +1621,8 @@
           <pc:sldMk cId="1134725105" sldId="290"/>
         </pc:sldMkLst>
       </pc:sldChg>
-      <pc:sldChg chg="addSp delSp modSp add mod setBg setClrOvrMap">
-        <pc:chgData name="Kristofer Carta" userId="a949ead7c4bcd18f" providerId="LiveId" clId="{BDB12BE9-6248-4518-AD0A-7BEFF3A06A4A}" dt="2017-08-22T20:32:05.030" v="399" actId="20577"/>
+      <pc:sldChg chg="addSp delSp modSp add mod setBg setClrOvrMap delDesignElem">
+        <pc:chgData name="Kristofer Carta" userId="a949ead7c4bcd18f" providerId="LiveId" clId="{BDB12BE9-6248-4518-AD0A-7BEFF3A06A4A}" dt="2017-08-23T09:34:09.247" v="13376"/>
         <pc:sldMkLst>
           <pc:docMk/>
           <pc:sldMk cId="3013723820" sldId="290"/>
@@ -1580,8 +1643,8 @@
             <ac:spMk id="3" creationId="{00000000-0000-0000-0000-000000000000}"/>
           </ac:spMkLst>
         </pc:spChg>
-        <pc:spChg chg="add">
-          <ac:chgData name="Kristofer Carta" userId="a949ead7c4bcd18f" providerId="LiveId" clId="{BDB12BE9-6248-4518-AD0A-7BEFF3A06A4A}" dt="2017-08-22T20:31:55.595" v="389" actId="26606"/>
+        <pc:spChg chg="add del">
+          <ac:chgData name="Kristofer Carta" userId="a949ead7c4bcd18f" providerId="LiveId" clId="{BDB12BE9-6248-4518-AD0A-7BEFF3A06A4A}" dt="2017-08-23T09:34:09.247" v="13376"/>
           <ac:spMkLst>
             <pc:docMk/>
             <pc:sldMk cId="3013723820" sldId="290"/>
@@ -1596,24 +1659,24 @@
             <ac:spMk id="6" creationId="{D2CD2CD0-13D2-494C-877E-454E1D21E2BD}"/>
           </ac:spMkLst>
         </pc:spChg>
-        <pc:spChg chg="add">
-          <ac:chgData name="Kristofer Carta" userId="a949ead7c4bcd18f" providerId="LiveId" clId="{BDB12BE9-6248-4518-AD0A-7BEFF3A06A4A}" dt="2017-08-22T20:31:55.595" v="389" actId="26606"/>
+        <pc:spChg chg="add del">
+          <ac:chgData name="Kristofer Carta" userId="a949ead7c4bcd18f" providerId="LiveId" clId="{BDB12BE9-6248-4518-AD0A-7BEFF3A06A4A}" dt="2017-08-23T09:34:09.247" v="13376"/>
           <ac:spMkLst>
             <pc:docMk/>
             <pc:sldMk cId="3013723820" sldId="290"/>
             <ac:spMk id="7" creationId="{00000000-0000-0000-0000-000000000000}"/>
           </ac:spMkLst>
         </pc:spChg>
-        <pc:spChg chg="add">
-          <ac:chgData name="Kristofer Carta" userId="a949ead7c4bcd18f" providerId="LiveId" clId="{BDB12BE9-6248-4518-AD0A-7BEFF3A06A4A}" dt="2017-08-22T20:31:55.595" v="389" actId="26606"/>
+        <pc:spChg chg="add del">
+          <ac:chgData name="Kristofer Carta" userId="a949ead7c4bcd18f" providerId="LiveId" clId="{BDB12BE9-6248-4518-AD0A-7BEFF3A06A4A}" dt="2017-08-23T09:34:09.247" v="13376"/>
           <ac:spMkLst>
             <pc:docMk/>
             <pc:sldMk cId="3013723820" sldId="290"/>
             <ac:spMk id="9" creationId="{00000000-0000-0000-0000-000000000000}"/>
           </ac:spMkLst>
         </pc:spChg>
-        <pc:spChg chg="add">
-          <ac:chgData name="Kristofer Carta" userId="a949ead7c4bcd18f" providerId="LiveId" clId="{BDB12BE9-6248-4518-AD0A-7BEFF3A06A4A}" dt="2017-08-22T20:31:55.595" v="389" actId="26606"/>
+        <pc:spChg chg="add del">
+          <ac:chgData name="Kristofer Carta" userId="a949ead7c4bcd18f" providerId="LiveId" clId="{BDB12BE9-6248-4518-AD0A-7BEFF3A06A4A}" dt="2017-08-23T09:34:09.247" v="13376"/>
           <ac:spMkLst>
             <pc:docMk/>
             <pc:sldMk cId="3013723820" sldId="290"/>
@@ -1685,8 +1748,8 @@
           </ac:picMkLst>
         </pc:picChg>
       </pc:sldChg>
-      <pc:sldChg chg="addSp delSp modSp add mod ord setBg setClrOvrMap">
-        <pc:chgData name="Kristofer Carta" userId="a949ead7c4bcd18f" providerId="LiveId" clId="{BDB12BE9-6248-4518-AD0A-7BEFF3A06A4A}" dt="2017-08-22T20:31:45.792" v="388" actId="26606"/>
+      <pc:sldChg chg="addSp delSp modSp add mod ord setBg setClrOvrMap delDesignElem">
+        <pc:chgData name="Kristofer Carta" userId="a949ead7c4bcd18f" providerId="LiveId" clId="{BDB12BE9-6248-4518-AD0A-7BEFF3A06A4A}" dt="2017-08-23T09:34:09.247" v="13376"/>
         <pc:sldMkLst>
           <pc:docMk/>
           <pc:sldMk cId="2069327080" sldId="291"/>
@@ -1723,32 +1786,32 @@
             <ac:spMk id="6" creationId="{88EE29C7-6914-4775-B50D-96023720F2D1}"/>
           </ac:spMkLst>
         </pc:spChg>
-        <pc:spChg chg="add">
-          <ac:chgData name="Kristofer Carta" userId="a949ead7c4bcd18f" providerId="LiveId" clId="{BDB12BE9-6248-4518-AD0A-7BEFF3A06A4A}" dt="2017-08-22T20:31:45.792" v="388" actId="26606"/>
+        <pc:spChg chg="add del">
+          <ac:chgData name="Kristofer Carta" userId="a949ead7c4bcd18f" providerId="LiveId" clId="{BDB12BE9-6248-4518-AD0A-7BEFF3A06A4A}" dt="2017-08-23T09:34:09.247" v="13376"/>
           <ac:spMkLst>
             <pc:docMk/>
             <pc:sldMk cId="2069327080" sldId="291"/>
             <ac:spMk id="11" creationId="{00000000-0000-0000-0000-000000000000}"/>
           </ac:spMkLst>
         </pc:spChg>
-        <pc:spChg chg="add">
-          <ac:chgData name="Kristofer Carta" userId="a949ead7c4bcd18f" providerId="LiveId" clId="{BDB12BE9-6248-4518-AD0A-7BEFF3A06A4A}" dt="2017-08-22T20:31:45.792" v="388" actId="26606"/>
+        <pc:spChg chg="add del">
+          <ac:chgData name="Kristofer Carta" userId="a949ead7c4bcd18f" providerId="LiveId" clId="{BDB12BE9-6248-4518-AD0A-7BEFF3A06A4A}" dt="2017-08-23T09:34:09.247" v="13376"/>
           <ac:spMkLst>
             <pc:docMk/>
             <pc:sldMk cId="2069327080" sldId="291"/>
             <ac:spMk id="13" creationId="{00000000-0000-0000-0000-000000000000}"/>
           </ac:spMkLst>
         </pc:spChg>
-        <pc:spChg chg="add">
-          <ac:chgData name="Kristofer Carta" userId="a949ead7c4bcd18f" providerId="LiveId" clId="{BDB12BE9-6248-4518-AD0A-7BEFF3A06A4A}" dt="2017-08-22T20:31:45.792" v="388" actId="26606"/>
+        <pc:spChg chg="add del">
+          <ac:chgData name="Kristofer Carta" userId="a949ead7c4bcd18f" providerId="LiveId" clId="{BDB12BE9-6248-4518-AD0A-7BEFF3A06A4A}" dt="2017-08-23T09:34:09.247" v="13376"/>
           <ac:spMkLst>
             <pc:docMk/>
             <pc:sldMk cId="2069327080" sldId="291"/>
             <ac:spMk id="15" creationId="{00000000-0000-0000-0000-000000000000}"/>
           </ac:spMkLst>
         </pc:spChg>
-        <pc:spChg chg="add">
-          <ac:chgData name="Kristofer Carta" userId="a949ead7c4bcd18f" providerId="LiveId" clId="{BDB12BE9-6248-4518-AD0A-7BEFF3A06A4A}" dt="2017-08-22T20:31:45.792" v="388" actId="26606"/>
+        <pc:spChg chg="add del">
+          <ac:chgData name="Kristofer Carta" userId="a949ead7c4bcd18f" providerId="LiveId" clId="{BDB12BE9-6248-4518-AD0A-7BEFF3A06A4A}" dt="2017-08-23T09:34:09.247" v="13376"/>
           <ac:spMkLst>
             <pc:docMk/>
             <pc:sldMk cId="2069327080" sldId="291"/>
@@ -2123,7 +2186,7 @@
         </pc:picChg>
       </pc:sldChg>
       <pc:sldChg chg="addSp delSp modSp add mod setBg setClrOvrMap delDesignElem">
-        <pc:chgData name="Kristofer Carta" userId="a949ead7c4bcd18f" providerId="LiveId" clId="{BDB12BE9-6248-4518-AD0A-7BEFF3A06A4A}" dt="2017-08-22T20:40:17.129" v="577" actId="26606"/>
+        <pc:chgData name="Kristofer Carta" userId="a949ead7c4bcd18f" providerId="LiveId" clId="{BDB12BE9-6248-4518-AD0A-7BEFF3A06A4A}" dt="2017-08-23T09:34:09.247" v="13376"/>
         <pc:sldMkLst>
           <pc:docMk/>
           <pc:sldMk cId="1180048117" sldId="301"/>
@@ -2224,32 +2287,32 @@
             <ac:spMk id="20" creationId="{00000000-0000-0000-0000-000000000000}"/>
           </ac:spMkLst>
         </pc:spChg>
-        <pc:spChg chg="add">
-          <ac:chgData name="Kristofer Carta" userId="a949ead7c4bcd18f" providerId="LiveId" clId="{BDB12BE9-6248-4518-AD0A-7BEFF3A06A4A}" dt="2017-08-22T20:40:17.129" v="577" actId="26606"/>
+        <pc:spChg chg="add del">
+          <ac:chgData name="Kristofer Carta" userId="a949ead7c4bcd18f" providerId="LiveId" clId="{BDB12BE9-6248-4518-AD0A-7BEFF3A06A4A}" dt="2017-08-23T09:34:09.247" v="13376"/>
           <ac:spMkLst>
             <pc:docMk/>
             <pc:sldMk cId="1180048117" sldId="301"/>
             <ac:spMk id="24" creationId="{00000000-0000-0000-0000-000000000000}"/>
           </ac:spMkLst>
         </pc:spChg>
-        <pc:spChg chg="add">
-          <ac:chgData name="Kristofer Carta" userId="a949ead7c4bcd18f" providerId="LiveId" clId="{BDB12BE9-6248-4518-AD0A-7BEFF3A06A4A}" dt="2017-08-22T20:40:17.129" v="577" actId="26606"/>
+        <pc:spChg chg="add del">
+          <ac:chgData name="Kristofer Carta" userId="a949ead7c4bcd18f" providerId="LiveId" clId="{BDB12BE9-6248-4518-AD0A-7BEFF3A06A4A}" dt="2017-08-23T09:34:09.247" v="13376"/>
           <ac:spMkLst>
             <pc:docMk/>
             <pc:sldMk cId="1180048117" sldId="301"/>
             <ac:spMk id="25" creationId="{00000000-0000-0000-0000-000000000000}"/>
           </ac:spMkLst>
         </pc:spChg>
-        <pc:spChg chg="add">
-          <ac:chgData name="Kristofer Carta" userId="a949ead7c4bcd18f" providerId="LiveId" clId="{BDB12BE9-6248-4518-AD0A-7BEFF3A06A4A}" dt="2017-08-22T20:40:17.129" v="577" actId="26606"/>
+        <pc:spChg chg="add del">
+          <ac:chgData name="Kristofer Carta" userId="a949ead7c4bcd18f" providerId="LiveId" clId="{BDB12BE9-6248-4518-AD0A-7BEFF3A06A4A}" dt="2017-08-23T09:34:09.247" v="13376"/>
           <ac:spMkLst>
             <pc:docMk/>
             <pc:sldMk cId="1180048117" sldId="301"/>
             <ac:spMk id="26" creationId="{00000000-0000-0000-0000-000000000000}"/>
           </ac:spMkLst>
         </pc:spChg>
-        <pc:spChg chg="add">
-          <ac:chgData name="Kristofer Carta" userId="a949ead7c4bcd18f" providerId="LiveId" clId="{BDB12BE9-6248-4518-AD0A-7BEFF3A06A4A}" dt="2017-08-22T20:40:17.129" v="577" actId="26606"/>
+        <pc:spChg chg="add del">
+          <ac:chgData name="Kristofer Carta" userId="a949ead7c4bcd18f" providerId="LiveId" clId="{BDB12BE9-6248-4518-AD0A-7BEFF3A06A4A}" dt="2017-08-23T09:34:09.247" v="13376"/>
           <ac:spMkLst>
             <pc:docMk/>
             <pc:sldMk cId="1180048117" sldId="301"/>
@@ -2366,8 +2429,8 @@
           </ac:picMkLst>
         </pc:picChg>
       </pc:sldChg>
-      <pc:sldChg chg="modSp add ord">
-        <pc:chgData name="Kristofer Carta" userId="a949ead7c4bcd18f" providerId="LiveId" clId="{BDB12BE9-6248-4518-AD0A-7BEFF3A06A4A}" dt="2017-08-22T21:01:25.667" v="1137" actId="20577"/>
+      <pc:sldChg chg="addSp delSp modSp add ord delDesignElem">
+        <pc:chgData name="Kristofer Carta" userId="a949ead7c4bcd18f" providerId="LiveId" clId="{BDB12BE9-6248-4518-AD0A-7BEFF3A06A4A}" dt="2017-08-23T09:34:09.247" v="13376"/>
         <pc:sldMkLst>
           <pc:docMk/>
           <pc:sldMk cId="1502807105" sldId="304"/>
@@ -2378,6 +2441,38 @@
             <pc:docMk/>
             <pc:sldMk cId="1502807105" sldId="304"/>
             <ac:spMk id="2" creationId="{00000000-0000-0000-0000-000000000000}"/>
+          </ac:spMkLst>
+        </pc:spChg>
+        <pc:spChg chg="add del">
+          <ac:chgData name="Kristofer Carta" userId="a949ead7c4bcd18f" providerId="LiveId" clId="{BDB12BE9-6248-4518-AD0A-7BEFF3A06A4A}" dt="2017-08-23T09:34:09.247" v="13376"/>
+          <ac:spMkLst>
+            <pc:docMk/>
+            <pc:sldMk cId="1502807105" sldId="304"/>
+            <ac:spMk id="24" creationId="{00000000-0000-0000-0000-000000000000}"/>
+          </ac:spMkLst>
+        </pc:spChg>
+        <pc:spChg chg="add del">
+          <ac:chgData name="Kristofer Carta" userId="a949ead7c4bcd18f" providerId="LiveId" clId="{BDB12BE9-6248-4518-AD0A-7BEFF3A06A4A}" dt="2017-08-23T09:34:09.247" v="13376"/>
+          <ac:spMkLst>
+            <pc:docMk/>
+            <pc:sldMk cId="1502807105" sldId="304"/>
+            <ac:spMk id="25" creationId="{00000000-0000-0000-0000-000000000000}"/>
+          </ac:spMkLst>
+        </pc:spChg>
+        <pc:spChg chg="add del">
+          <ac:chgData name="Kristofer Carta" userId="a949ead7c4bcd18f" providerId="LiveId" clId="{BDB12BE9-6248-4518-AD0A-7BEFF3A06A4A}" dt="2017-08-23T09:34:09.247" v="13376"/>
+          <ac:spMkLst>
+            <pc:docMk/>
+            <pc:sldMk cId="1502807105" sldId="304"/>
+            <ac:spMk id="26" creationId="{00000000-0000-0000-0000-000000000000}"/>
+          </ac:spMkLst>
+        </pc:spChg>
+        <pc:spChg chg="add del">
+          <ac:chgData name="Kristofer Carta" userId="a949ead7c4bcd18f" providerId="LiveId" clId="{BDB12BE9-6248-4518-AD0A-7BEFF3A06A4A}" dt="2017-08-23T09:34:09.247" v="13376"/>
+          <ac:spMkLst>
+            <pc:docMk/>
+            <pc:sldMk cId="1502807105" sldId="304"/>
+            <ac:spMk id="27" creationId="{00000000-0000-0000-0000-000000000000}"/>
           </ac:spMkLst>
         </pc:spChg>
       </pc:sldChg>
@@ -2964,14 +3059,14 @@
         </pc:picChg>
       </pc:sldChg>
       <pc:sldChg chg="add">
-        <pc:chgData name="Kristofer Carta" userId="a949ead7c4bcd18f" providerId="LiveId" clId="{BDB12BE9-6248-4518-AD0A-7BEFF3A06A4A}" dt="2017-08-23T06:28:05.946" v="2952"/>
+        <pc:chgData name="Kristofer Carta" userId="a949ead7c4bcd18f" providerId="LiveId" clId="{BDB12BE9-6248-4518-AD0A-7BEFF3A06A4A}" dt="2017-08-23T06:28:05.946" v="2952" actId="1076"/>
         <pc:sldMkLst>
           <pc:docMk/>
           <pc:sldMk cId="2324310570" sldId="319"/>
         </pc:sldMkLst>
       </pc:sldChg>
       <pc:sldChg chg="add">
-        <pc:chgData name="Kristofer Carta" userId="a949ead7c4bcd18f" providerId="LiveId" clId="{BDB12BE9-6248-4518-AD0A-7BEFF3A06A4A}" dt="2017-08-23T06:28:05.946" v="2952"/>
+        <pc:chgData name="Kristofer Carta" userId="a949ead7c4bcd18f" providerId="LiveId" clId="{BDB12BE9-6248-4518-AD0A-7BEFF3A06A4A}" dt="2017-08-23T06:28:05.946" v="2952" actId="1076"/>
         <pc:sldMkLst>
           <pc:docMk/>
           <pc:sldMk cId="2666954499" sldId="320"/>
@@ -3039,7 +3134,7 @@
         </pc:spChg>
       </pc:sldChg>
       <pc:sldChg chg="modSp add ord">
-        <pc:chgData name="Kristofer Carta" userId="a949ead7c4bcd18f" providerId="LiveId" clId="{BDB12BE9-6248-4518-AD0A-7BEFF3A06A4A}" dt="2017-08-23T07:00:06.390" v="4947"/>
+        <pc:chgData name="Kristofer Carta" userId="a949ead7c4bcd18f" providerId="LiveId" clId="{BDB12BE9-6248-4518-AD0A-7BEFF3A06A4A}" dt="2017-08-23T07:00:06.390" v="4947" actId="1076"/>
         <pc:sldMkLst>
           <pc:docMk/>
           <pc:sldMk cId="1837948902" sldId="324"/>
@@ -3224,7 +3319,7 @@
           </ac:spMkLst>
         </pc:spChg>
         <pc:spChg chg="add del">
-          <ac:chgData name="Kristofer Carta" userId="a949ead7c4bcd18f" providerId="LiveId" clId="{BDB12BE9-6248-4518-AD0A-7BEFF3A06A4A}" dt="2017-08-23T09:23:51.220" v="12873"/>
+          <ac:chgData name="Kristofer Carta" userId="a949ead7c4bcd18f" providerId="LiveId" clId="{BDB12BE9-6248-4518-AD0A-7BEFF3A06A4A}" dt="2017-08-23T09:23:51.220" v="12873" actId="1076"/>
           <ac:spMkLst>
             <pc:docMk/>
             <pc:sldMk cId="443018284" sldId="329"/>
@@ -3265,7 +3360,7 @@
         </pc:picChg>
       </pc:sldChg>
       <pc:sldChg chg="add">
-        <pc:chgData name="Kristofer Carta" userId="a949ead7c4bcd18f" providerId="LiveId" clId="{BDB12BE9-6248-4518-AD0A-7BEFF3A06A4A}" dt="2017-08-23T09:23:19.104" v="12839"/>
+        <pc:chgData name="Kristofer Carta" userId="a949ead7c4bcd18f" providerId="LiveId" clId="{BDB12BE9-6248-4518-AD0A-7BEFF3A06A4A}" dt="2017-08-23T09:23:19.104" v="12839" actId="1076"/>
         <pc:sldMkLst>
           <pc:docMk/>
           <pc:sldMk cId="142365089" sldId="330"/>
@@ -14977,7 +15072,7 @@
           <a:p>
             <a:r>
               <a:rPr lang="en-US" dirty="0"/>
-              <a:t>Course Background</a:t>
+              <a:t>Course Background – One More Time</a:t>
             </a:r>
           </a:p>
         </p:txBody>
@@ -20430,7 +20525,7 @@
         </p:nvSpPr>
         <p:spPr>
           <a:xfrm>
-            <a:off x="2741644" y="2197163"/>
+            <a:off x="2540309" y="2197163"/>
             <a:ext cx="7772399" cy="4154361"/>
           </a:xfrm>
         </p:spPr>
@@ -20459,9 +20554,19 @@
               <a:buNone/>
             </a:pPr>
             <a:r>
-              <a:rPr lang="en-US" dirty="0"/>
-              <a:t>LINK HERE</a:t>
-            </a:r>
+              <a:rPr lang="en-US" dirty="0">
+                <a:solidFill>
+                  <a:schemeClr val="bg1"/>
+                </a:solidFill>
+                <a:hlinkClick r:id="rId2"/>
+              </a:rPr>
+              <a:t>https://github.com/kcarta/programming-workshop</a:t>
+            </a:r>
+            <a:endParaRPr lang="en-US" dirty="0">
+              <a:solidFill>
+                <a:schemeClr val="bg1"/>
+              </a:solidFill>
+            </a:endParaRPr>
           </a:p>
           <a:p>
             <a:pPr marL="0" indent="0">
@@ -22753,8 +22858,13 @@
             </a:r>
             <a:r>
               <a:rPr lang="en-US" sz="2400" dirty="0"/>
-              <a:t>: Becoming a Windows “power user”</a:t>
-            </a:r>
+              <a:t>: Looking at Windows as </a:t>
+            </a:r>
+            <a:r>
+              <a:rPr lang="en-US" sz="2400"/>
+              <a:t>a developer, not a user</a:t>
+            </a:r>
+            <a:endParaRPr lang="en-US" sz="2400" dirty="0"/>
           </a:p>
           <a:p>
             <a:pPr>

</xml_diff>

<commit_message>
Fix small errors in presentations
</commit_message>
<xml_diff>
--- a/Presentations/2. Windows.pptx
+++ b/Presentations/2. Windows.pptx
@@ -884,7 +884,7 @@
   <pc:docChgLst>
     <pc:chgData name="Kristofer Carta" userId="a949ead7c4bcd18f" providerId="LiveId" clId="{BDB12BE9-6248-4518-AD0A-7BEFF3A06A4A}"/>
     <pc:docChg chg="undo redo custSel addSld delSld modSld sldOrd delMainMaster modSection">
-      <pc:chgData name="Kristofer Carta" userId="a949ead7c4bcd18f" providerId="LiveId" clId="{BDB12BE9-6248-4518-AD0A-7BEFF3A06A4A}" dt="2017-08-23T09:35:41.418" v="13527" actId="20577"/>
+      <pc:chgData name="Kristofer Carta" userId="a949ead7c4bcd18f" providerId="LiveId" clId="{BDB12BE9-6248-4518-AD0A-7BEFF3A06A4A}" dt="2017-08-23T11:02:12.182" v="13528"/>
       <pc:docMkLst>
         <pc:docMk/>
       </pc:docMkLst>
@@ -919,7 +919,7 @@
         </pc:spChg>
       </pc:sldChg>
       <pc:sldChg chg="addSp delSp modSp delDesignElem">
-        <pc:chgData name="Kristofer Carta" userId="a949ead7c4bcd18f" providerId="LiveId" clId="{BDB12BE9-6248-4518-AD0A-7BEFF3A06A4A}" dt="2017-08-23T09:34:09.247" v="13376"/>
+        <pc:chgData name="Kristofer Carta" userId="a949ead7c4bcd18f" providerId="LiveId" clId="{BDB12BE9-6248-4518-AD0A-7BEFF3A06A4A}" dt="2017-08-23T09:34:09.247" v="13376" actId="20577"/>
         <pc:sldMkLst>
           <pc:docMk/>
           <pc:sldMk cId="3212783590" sldId="258"/>
@@ -933,7 +933,7 @@
           </ac:spMkLst>
         </pc:spChg>
         <pc:spChg chg="add del">
-          <ac:chgData name="Kristofer Carta" userId="a949ead7c4bcd18f" providerId="LiveId" clId="{BDB12BE9-6248-4518-AD0A-7BEFF3A06A4A}" dt="2017-08-23T09:34:09.247" v="13376"/>
+          <ac:chgData name="Kristofer Carta" userId="a949ead7c4bcd18f" providerId="LiveId" clId="{BDB12BE9-6248-4518-AD0A-7BEFF3A06A4A}" dt="2017-08-23T09:34:09.247" v="13376" actId="20577"/>
           <ac:spMkLst>
             <pc:docMk/>
             <pc:sldMk cId="3212783590" sldId="258"/>
@@ -963,7 +963,7 @@
           </ac:spMkLst>
         </pc:spChg>
         <pc:spChg chg="add del">
-          <ac:chgData name="Kristofer Carta" userId="a949ead7c4bcd18f" providerId="LiveId" clId="{BDB12BE9-6248-4518-AD0A-7BEFF3A06A4A}" dt="2017-08-23T09:34:09.247" v="13376"/>
+          <ac:chgData name="Kristofer Carta" userId="a949ead7c4bcd18f" providerId="LiveId" clId="{BDB12BE9-6248-4518-AD0A-7BEFF3A06A4A}" dt="2017-08-23T09:34:09.247" v="13376" actId="20577"/>
           <ac:spMkLst>
             <pc:docMk/>
             <pc:sldMk cId="3956988050" sldId="260"/>
@@ -971,7 +971,7 @@
           </ac:spMkLst>
         </pc:spChg>
         <pc:spChg chg="add del">
-          <ac:chgData name="Kristofer Carta" userId="a949ead7c4bcd18f" providerId="LiveId" clId="{BDB12BE9-6248-4518-AD0A-7BEFF3A06A4A}" dt="2017-08-23T09:34:09.247" v="13376"/>
+          <ac:chgData name="Kristofer Carta" userId="a949ead7c4bcd18f" providerId="LiveId" clId="{BDB12BE9-6248-4518-AD0A-7BEFF3A06A4A}" dt="2017-08-23T09:34:09.247" v="13376" actId="20577"/>
           <ac:spMkLst>
             <pc:docMk/>
             <pc:sldMk cId="3956988050" sldId="260"/>
@@ -1043,7 +1043,7 @@
         </pc:sldMkLst>
       </pc:sldChg>
       <pc:sldChg chg="addSp delSp modSp delDesignElem">
-        <pc:chgData name="Kristofer Carta" userId="a949ead7c4bcd18f" providerId="LiveId" clId="{BDB12BE9-6248-4518-AD0A-7BEFF3A06A4A}" dt="2017-08-23T09:34:09.247" v="13376"/>
+        <pc:chgData name="Kristofer Carta" userId="a949ead7c4bcd18f" providerId="LiveId" clId="{BDB12BE9-6248-4518-AD0A-7BEFF3A06A4A}" dt="2017-08-23T11:02:12.182" v="13528"/>
         <pc:sldMkLst>
           <pc:docMk/>
           <pc:sldMk cId="2783061044" sldId="271"/>
@@ -1057,7 +1057,7 @@
           </ac:spMkLst>
         </pc:spChg>
         <pc:spChg chg="mod">
-          <ac:chgData name="Kristofer Carta" userId="a949ead7c4bcd18f" providerId="LiveId" clId="{BDB12BE9-6248-4518-AD0A-7BEFF3A06A4A}" dt="2017-08-23T09:33:10.378" v="13367" actId="1076"/>
+          <ac:chgData name="Kristofer Carta" userId="a949ead7c4bcd18f" providerId="LiveId" clId="{BDB12BE9-6248-4518-AD0A-7BEFF3A06A4A}" dt="2017-08-23T11:02:12.182" v="13528"/>
           <ac:spMkLst>
             <pc:docMk/>
             <pc:sldMk cId="2783061044" sldId="271"/>
@@ -1065,7 +1065,7 @@
           </ac:spMkLst>
         </pc:spChg>
         <pc:spChg chg="add del">
-          <ac:chgData name="Kristofer Carta" userId="a949ead7c4bcd18f" providerId="LiveId" clId="{BDB12BE9-6248-4518-AD0A-7BEFF3A06A4A}" dt="2017-08-23T09:34:09.247" v="13376"/>
+          <ac:chgData name="Kristofer Carta" userId="a949ead7c4bcd18f" providerId="LiveId" clId="{BDB12BE9-6248-4518-AD0A-7BEFF3A06A4A}" dt="2017-08-23T09:34:09.247" v="13376" actId="20577"/>
           <ac:spMkLst>
             <pc:docMk/>
             <pc:sldMk cId="2783061044" sldId="271"/>
@@ -1073,7 +1073,7 @@
           </ac:spMkLst>
         </pc:spChg>
         <pc:spChg chg="add del">
-          <ac:chgData name="Kristofer Carta" userId="a949ead7c4bcd18f" providerId="LiveId" clId="{BDB12BE9-6248-4518-AD0A-7BEFF3A06A4A}" dt="2017-08-23T09:34:09.247" v="13376"/>
+          <ac:chgData name="Kristofer Carta" userId="a949ead7c4bcd18f" providerId="LiveId" clId="{BDB12BE9-6248-4518-AD0A-7BEFF3A06A4A}" dt="2017-08-23T09:34:09.247" v="13376" actId="20577"/>
           <ac:spMkLst>
             <pc:docMk/>
             <pc:sldMk cId="2783061044" sldId="271"/>
@@ -1081,7 +1081,7 @@
           </ac:spMkLst>
         </pc:spChg>
         <pc:spChg chg="add del">
-          <ac:chgData name="Kristofer Carta" userId="a949ead7c4bcd18f" providerId="LiveId" clId="{BDB12BE9-6248-4518-AD0A-7BEFF3A06A4A}" dt="2017-08-23T09:34:09.247" v="13376"/>
+          <ac:chgData name="Kristofer Carta" userId="a949ead7c4bcd18f" providerId="LiveId" clId="{BDB12BE9-6248-4518-AD0A-7BEFF3A06A4A}" dt="2017-08-23T09:34:09.247" v="13376" actId="20577"/>
           <ac:spMkLst>
             <pc:docMk/>
             <pc:sldMk cId="2783061044" sldId="271"/>
@@ -1622,7 +1622,7 @@
         </pc:sldMkLst>
       </pc:sldChg>
       <pc:sldChg chg="addSp delSp modSp add mod setBg setClrOvrMap delDesignElem">
-        <pc:chgData name="Kristofer Carta" userId="a949ead7c4bcd18f" providerId="LiveId" clId="{BDB12BE9-6248-4518-AD0A-7BEFF3A06A4A}" dt="2017-08-23T09:34:09.247" v="13376"/>
+        <pc:chgData name="Kristofer Carta" userId="a949ead7c4bcd18f" providerId="LiveId" clId="{BDB12BE9-6248-4518-AD0A-7BEFF3A06A4A}" dt="2017-08-23T09:34:09.247" v="13376" actId="20577"/>
         <pc:sldMkLst>
           <pc:docMk/>
           <pc:sldMk cId="3013723820" sldId="290"/>
@@ -1644,7 +1644,7 @@
           </ac:spMkLst>
         </pc:spChg>
         <pc:spChg chg="add del">
-          <ac:chgData name="Kristofer Carta" userId="a949ead7c4bcd18f" providerId="LiveId" clId="{BDB12BE9-6248-4518-AD0A-7BEFF3A06A4A}" dt="2017-08-23T09:34:09.247" v="13376"/>
+          <ac:chgData name="Kristofer Carta" userId="a949ead7c4bcd18f" providerId="LiveId" clId="{BDB12BE9-6248-4518-AD0A-7BEFF3A06A4A}" dt="2017-08-23T09:34:09.247" v="13376" actId="20577"/>
           <ac:spMkLst>
             <pc:docMk/>
             <pc:sldMk cId="3013723820" sldId="290"/>
@@ -1660,7 +1660,7 @@
           </ac:spMkLst>
         </pc:spChg>
         <pc:spChg chg="add del">
-          <ac:chgData name="Kristofer Carta" userId="a949ead7c4bcd18f" providerId="LiveId" clId="{BDB12BE9-6248-4518-AD0A-7BEFF3A06A4A}" dt="2017-08-23T09:34:09.247" v="13376"/>
+          <ac:chgData name="Kristofer Carta" userId="a949ead7c4bcd18f" providerId="LiveId" clId="{BDB12BE9-6248-4518-AD0A-7BEFF3A06A4A}" dt="2017-08-23T09:34:09.247" v="13376" actId="20577"/>
           <ac:spMkLst>
             <pc:docMk/>
             <pc:sldMk cId="3013723820" sldId="290"/>
@@ -1668,7 +1668,7 @@
           </ac:spMkLst>
         </pc:spChg>
         <pc:spChg chg="add del">
-          <ac:chgData name="Kristofer Carta" userId="a949ead7c4bcd18f" providerId="LiveId" clId="{BDB12BE9-6248-4518-AD0A-7BEFF3A06A4A}" dt="2017-08-23T09:34:09.247" v="13376"/>
+          <ac:chgData name="Kristofer Carta" userId="a949ead7c4bcd18f" providerId="LiveId" clId="{BDB12BE9-6248-4518-AD0A-7BEFF3A06A4A}" dt="2017-08-23T09:34:09.247" v="13376" actId="20577"/>
           <ac:spMkLst>
             <pc:docMk/>
             <pc:sldMk cId="3013723820" sldId="290"/>
@@ -1676,7 +1676,7 @@
           </ac:spMkLst>
         </pc:spChg>
         <pc:spChg chg="add del">
-          <ac:chgData name="Kristofer Carta" userId="a949ead7c4bcd18f" providerId="LiveId" clId="{BDB12BE9-6248-4518-AD0A-7BEFF3A06A4A}" dt="2017-08-23T09:34:09.247" v="13376"/>
+          <ac:chgData name="Kristofer Carta" userId="a949ead7c4bcd18f" providerId="LiveId" clId="{BDB12BE9-6248-4518-AD0A-7BEFF3A06A4A}" dt="2017-08-23T09:34:09.247" v="13376" actId="20577"/>
           <ac:spMkLst>
             <pc:docMk/>
             <pc:sldMk cId="3013723820" sldId="290"/>
@@ -1749,7 +1749,7 @@
         </pc:picChg>
       </pc:sldChg>
       <pc:sldChg chg="addSp delSp modSp add mod ord setBg setClrOvrMap delDesignElem">
-        <pc:chgData name="Kristofer Carta" userId="a949ead7c4bcd18f" providerId="LiveId" clId="{BDB12BE9-6248-4518-AD0A-7BEFF3A06A4A}" dt="2017-08-23T09:34:09.247" v="13376"/>
+        <pc:chgData name="Kristofer Carta" userId="a949ead7c4bcd18f" providerId="LiveId" clId="{BDB12BE9-6248-4518-AD0A-7BEFF3A06A4A}" dt="2017-08-23T09:34:09.247" v="13376" actId="20577"/>
         <pc:sldMkLst>
           <pc:docMk/>
           <pc:sldMk cId="2069327080" sldId="291"/>
@@ -1787,7 +1787,7 @@
           </ac:spMkLst>
         </pc:spChg>
         <pc:spChg chg="add del">
-          <ac:chgData name="Kristofer Carta" userId="a949ead7c4bcd18f" providerId="LiveId" clId="{BDB12BE9-6248-4518-AD0A-7BEFF3A06A4A}" dt="2017-08-23T09:34:09.247" v="13376"/>
+          <ac:chgData name="Kristofer Carta" userId="a949ead7c4bcd18f" providerId="LiveId" clId="{BDB12BE9-6248-4518-AD0A-7BEFF3A06A4A}" dt="2017-08-23T09:34:09.247" v="13376" actId="20577"/>
           <ac:spMkLst>
             <pc:docMk/>
             <pc:sldMk cId="2069327080" sldId="291"/>
@@ -1795,7 +1795,7 @@
           </ac:spMkLst>
         </pc:spChg>
         <pc:spChg chg="add del">
-          <ac:chgData name="Kristofer Carta" userId="a949ead7c4bcd18f" providerId="LiveId" clId="{BDB12BE9-6248-4518-AD0A-7BEFF3A06A4A}" dt="2017-08-23T09:34:09.247" v="13376"/>
+          <ac:chgData name="Kristofer Carta" userId="a949ead7c4bcd18f" providerId="LiveId" clId="{BDB12BE9-6248-4518-AD0A-7BEFF3A06A4A}" dt="2017-08-23T09:34:09.247" v="13376" actId="20577"/>
           <ac:spMkLst>
             <pc:docMk/>
             <pc:sldMk cId="2069327080" sldId="291"/>
@@ -1803,7 +1803,7 @@
           </ac:spMkLst>
         </pc:spChg>
         <pc:spChg chg="add del">
-          <ac:chgData name="Kristofer Carta" userId="a949ead7c4bcd18f" providerId="LiveId" clId="{BDB12BE9-6248-4518-AD0A-7BEFF3A06A4A}" dt="2017-08-23T09:34:09.247" v="13376"/>
+          <ac:chgData name="Kristofer Carta" userId="a949ead7c4bcd18f" providerId="LiveId" clId="{BDB12BE9-6248-4518-AD0A-7BEFF3A06A4A}" dt="2017-08-23T09:34:09.247" v="13376" actId="20577"/>
           <ac:spMkLst>
             <pc:docMk/>
             <pc:sldMk cId="2069327080" sldId="291"/>
@@ -1811,7 +1811,7 @@
           </ac:spMkLst>
         </pc:spChg>
         <pc:spChg chg="add del">
-          <ac:chgData name="Kristofer Carta" userId="a949ead7c4bcd18f" providerId="LiveId" clId="{BDB12BE9-6248-4518-AD0A-7BEFF3A06A4A}" dt="2017-08-23T09:34:09.247" v="13376"/>
+          <ac:chgData name="Kristofer Carta" userId="a949ead7c4bcd18f" providerId="LiveId" clId="{BDB12BE9-6248-4518-AD0A-7BEFF3A06A4A}" dt="2017-08-23T09:34:09.247" v="13376" actId="20577"/>
           <ac:spMkLst>
             <pc:docMk/>
             <pc:sldMk cId="2069327080" sldId="291"/>
@@ -2186,7 +2186,7 @@
         </pc:picChg>
       </pc:sldChg>
       <pc:sldChg chg="addSp delSp modSp add mod setBg setClrOvrMap delDesignElem">
-        <pc:chgData name="Kristofer Carta" userId="a949ead7c4bcd18f" providerId="LiveId" clId="{BDB12BE9-6248-4518-AD0A-7BEFF3A06A4A}" dt="2017-08-23T09:34:09.247" v="13376"/>
+        <pc:chgData name="Kristofer Carta" userId="a949ead7c4bcd18f" providerId="LiveId" clId="{BDB12BE9-6248-4518-AD0A-7BEFF3A06A4A}" dt="2017-08-23T09:34:09.247" v="13376" actId="20577"/>
         <pc:sldMkLst>
           <pc:docMk/>
           <pc:sldMk cId="1180048117" sldId="301"/>
@@ -2288,7 +2288,7 @@
           </ac:spMkLst>
         </pc:spChg>
         <pc:spChg chg="add del">
-          <ac:chgData name="Kristofer Carta" userId="a949ead7c4bcd18f" providerId="LiveId" clId="{BDB12BE9-6248-4518-AD0A-7BEFF3A06A4A}" dt="2017-08-23T09:34:09.247" v="13376"/>
+          <ac:chgData name="Kristofer Carta" userId="a949ead7c4bcd18f" providerId="LiveId" clId="{BDB12BE9-6248-4518-AD0A-7BEFF3A06A4A}" dt="2017-08-23T09:34:09.247" v="13376" actId="20577"/>
           <ac:spMkLst>
             <pc:docMk/>
             <pc:sldMk cId="1180048117" sldId="301"/>
@@ -2296,7 +2296,7 @@
           </ac:spMkLst>
         </pc:spChg>
         <pc:spChg chg="add del">
-          <ac:chgData name="Kristofer Carta" userId="a949ead7c4bcd18f" providerId="LiveId" clId="{BDB12BE9-6248-4518-AD0A-7BEFF3A06A4A}" dt="2017-08-23T09:34:09.247" v="13376"/>
+          <ac:chgData name="Kristofer Carta" userId="a949ead7c4bcd18f" providerId="LiveId" clId="{BDB12BE9-6248-4518-AD0A-7BEFF3A06A4A}" dt="2017-08-23T09:34:09.247" v="13376" actId="20577"/>
           <ac:spMkLst>
             <pc:docMk/>
             <pc:sldMk cId="1180048117" sldId="301"/>
@@ -2304,7 +2304,7 @@
           </ac:spMkLst>
         </pc:spChg>
         <pc:spChg chg="add del">
-          <ac:chgData name="Kristofer Carta" userId="a949ead7c4bcd18f" providerId="LiveId" clId="{BDB12BE9-6248-4518-AD0A-7BEFF3A06A4A}" dt="2017-08-23T09:34:09.247" v="13376"/>
+          <ac:chgData name="Kristofer Carta" userId="a949ead7c4bcd18f" providerId="LiveId" clId="{BDB12BE9-6248-4518-AD0A-7BEFF3A06A4A}" dt="2017-08-23T09:34:09.247" v="13376" actId="20577"/>
           <ac:spMkLst>
             <pc:docMk/>
             <pc:sldMk cId="1180048117" sldId="301"/>
@@ -2312,7 +2312,7 @@
           </ac:spMkLst>
         </pc:spChg>
         <pc:spChg chg="add del">
-          <ac:chgData name="Kristofer Carta" userId="a949ead7c4bcd18f" providerId="LiveId" clId="{BDB12BE9-6248-4518-AD0A-7BEFF3A06A4A}" dt="2017-08-23T09:34:09.247" v="13376"/>
+          <ac:chgData name="Kristofer Carta" userId="a949ead7c4bcd18f" providerId="LiveId" clId="{BDB12BE9-6248-4518-AD0A-7BEFF3A06A4A}" dt="2017-08-23T09:34:09.247" v="13376" actId="20577"/>
           <ac:spMkLst>
             <pc:docMk/>
             <pc:sldMk cId="1180048117" sldId="301"/>
@@ -2430,7 +2430,7 @@
         </pc:picChg>
       </pc:sldChg>
       <pc:sldChg chg="addSp delSp modSp add ord delDesignElem">
-        <pc:chgData name="Kristofer Carta" userId="a949ead7c4bcd18f" providerId="LiveId" clId="{BDB12BE9-6248-4518-AD0A-7BEFF3A06A4A}" dt="2017-08-23T09:34:09.247" v="13376"/>
+        <pc:chgData name="Kristofer Carta" userId="a949ead7c4bcd18f" providerId="LiveId" clId="{BDB12BE9-6248-4518-AD0A-7BEFF3A06A4A}" dt="2017-08-23T09:34:09.247" v="13376" actId="20577"/>
         <pc:sldMkLst>
           <pc:docMk/>
           <pc:sldMk cId="1502807105" sldId="304"/>
@@ -2444,7 +2444,7 @@
           </ac:spMkLst>
         </pc:spChg>
         <pc:spChg chg="add del">
-          <ac:chgData name="Kristofer Carta" userId="a949ead7c4bcd18f" providerId="LiveId" clId="{BDB12BE9-6248-4518-AD0A-7BEFF3A06A4A}" dt="2017-08-23T09:34:09.247" v="13376"/>
+          <ac:chgData name="Kristofer Carta" userId="a949ead7c4bcd18f" providerId="LiveId" clId="{BDB12BE9-6248-4518-AD0A-7BEFF3A06A4A}" dt="2017-08-23T09:34:09.247" v="13376" actId="20577"/>
           <ac:spMkLst>
             <pc:docMk/>
             <pc:sldMk cId="1502807105" sldId="304"/>
@@ -2452,7 +2452,7 @@
           </ac:spMkLst>
         </pc:spChg>
         <pc:spChg chg="add del">
-          <ac:chgData name="Kristofer Carta" userId="a949ead7c4bcd18f" providerId="LiveId" clId="{BDB12BE9-6248-4518-AD0A-7BEFF3A06A4A}" dt="2017-08-23T09:34:09.247" v="13376"/>
+          <ac:chgData name="Kristofer Carta" userId="a949ead7c4bcd18f" providerId="LiveId" clId="{BDB12BE9-6248-4518-AD0A-7BEFF3A06A4A}" dt="2017-08-23T09:34:09.247" v="13376" actId="20577"/>
           <ac:spMkLst>
             <pc:docMk/>
             <pc:sldMk cId="1502807105" sldId="304"/>
@@ -2460,7 +2460,7 @@
           </ac:spMkLst>
         </pc:spChg>
         <pc:spChg chg="add del">
-          <ac:chgData name="Kristofer Carta" userId="a949ead7c4bcd18f" providerId="LiveId" clId="{BDB12BE9-6248-4518-AD0A-7BEFF3A06A4A}" dt="2017-08-23T09:34:09.247" v="13376"/>
+          <ac:chgData name="Kristofer Carta" userId="a949ead7c4bcd18f" providerId="LiveId" clId="{BDB12BE9-6248-4518-AD0A-7BEFF3A06A4A}" dt="2017-08-23T09:34:09.247" v="13376" actId="20577"/>
           <ac:spMkLst>
             <pc:docMk/>
             <pc:sldMk cId="1502807105" sldId="304"/>
@@ -2468,7 +2468,7 @@
           </ac:spMkLst>
         </pc:spChg>
         <pc:spChg chg="add del">
-          <ac:chgData name="Kristofer Carta" userId="a949ead7c4bcd18f" providerId="LiveId" clId="{BDB12BE9-6248-4518-AD0A-7BEFF3A06A4A}" dt="2017-08-23T09:34:09.247" v="13376"/>
+          <ac:chgData name="Kristofer Carta" userId="a949ead7c4bcd18f" providerId="LiveId" clId="{BDB12BE9-6248-4518-AD0A-7BEFF3A06A4A}" dt="2017-08-23T09:34:09.247" v="13376" actId="20577"/>
           <ac:spMkLst>
             <pc:docMk/>
             <pc:sldMk cId="1502807105" sldId="304"/>
@@ -20554,19 +20554,9 @@
               <a:buNone/>
             </a:pPr>
             <a:r>
-              <a:rPr lang="en-US" dirty="0">
-                <a:solidFill>
-                  <a:schemeClr val="bg1"/>
-                </a:solidFill>
-                <a:hlinkClick r:id="rId2"/>
-              </a:rPr>
+              <a:rPr lang="en-US" dirty="0"/>
               <a:t>https://github.com/kcarta/programming-workshop</a:t>
             </a:r>
-            <a:endParaRPr lang="en-US" dirty="0">
-              <a:solidFill>
-                <a:schemeClr val="bg1"/>
-              </a:solidFill>
-            </a:endParaRPr>
           </a:p>
           <a:p>
             <a:pPr marL="0" indent="0">

</xml_diff>